<commit_message>
Updated User Manual and BETA program presentations
</commit_message>
<xml_diff>
--- a/denodo-odata2-service-5.5/doc/201507 Customer BETA Program/DTUS-DODS-Denodo OData Service - 20150730 - Customer BETA Program Presentation.pptx
+++ b/denodo-odata2-service-5.5/doc/201507 Customer BETA Program/DTUS-DODS-Denodo OData Service - 20150730 - Customer BETA Program Presentation.pptx
@@ -121,6 +121,11 @@
       </a:defRPr>
     </a:lvl9pPr>
   </p:defaultTextStyle>
+  <p:extLst>
+    <p:ext uri="{EFAFB233-063F-42B5-8137-9DF3F51BA10A}">
+      <p15:sldGuideLst xmlns:p15="http://schemas.microsoft.com/office/powerpoint/2012/main"/>
+    </p:ext>
+  </p:extLst>
 </p:presentation>
 </file>
 
@@ -1182,7 +1187,7 @@
           </a:ln>
           <a:extLst>
             <a:ext uri="{C572A759-6A51-4108-AA02-DFA0A04FC94B}">
-              <ma14:wrappingTextBoxFlag xmlns:ma14="http://schemas.microsoft.com/office/mac/drawingml/2011/main" xmlns="" val="1"/>
+              <ma14:wrappingTextBoxFlag xmlns="" xmlns:ma14="http://schemas.microsoft.com/office/mac/drawingml/2011/main" val="1"/>
             </a:ext>
           </a:extLst>
         </p:spPr>
@@ -1376,7 +1381,7 @@
           </a:ln>
           <a:extLst>
             <a:ext uri="{C572A759-6A51-4108-AA02-DFA0A04FC94B}">
-              <ma14:wrappingTextBoxFlag xmlns:ma14="http://schemas.microsoft.com/office/mac/drawingml/2011/main" xmlns="" val="1"/>
+              <ma14:wrappingTextBoxFlag xmlns="" xmlns:ma14="http://schemas.microsoft.com/office/mac/drawingml/2011/main" val="1"/>
             </a:ext>
           </a:extLst>
         </p:spPr>
@@ -2468,7 +2473,7 @@
           </a:ln>
           <a:extLst>
             <a:ext uri="{C572A759-6A51-4108-AA02-DFA0A04FC94B}">
-              <ma14:wrappingTextBoxFlag xmlns:ma14="http://schemas.microsoft.com/office/mac/drawingml/2011/main" xmlns="" val="1"/>
+              <ma14:wrappingTextBoxFlag xmlns="" xmlns:ma14="http://schemas.microsoft.com/office/mac/drawingml/2011/main" val="1"/>
             </a:ext>
           </a:extLst>
         </p:spPr>
@@ -2509,7 +2514,7 @@
           </a:ln>
           <a:extLst>
             <a:ext uri="{C572A759-6A51-4108-AA02-DFA0A04FC94B}">
-              <ma14:wrappingTextBoxFlag xmlns:ma14="http://schemas.microsoft.com/office/mac/drawingml/2011/main" xmlns="" val="1"/>
+              <ma14:wrappingTextBoxFlag xmlns="" xmlns:ma14="http://schemas.microsoft.com/office/mac/drawingml/2011/main" val="1"/>
             </a:ext>
           </a:extLst>
         </p:spPr>
@@ -7970,12 +7975,36 @@
               <a:t>GA intended publishing date: </a:t>
             </a:r>
             <a:r>
+              <a:rPr sz="2400" b="1" dirty="0" smtClean="0">
+                <a:solidFill>
+                  <a:srgbClr val="404040"/>
+                </a:solidFill>
+              </a:rPr>
+              <a:t>2</a:t>
+            </a:r>
+            <a:r>
+              <a:rPr lang="en-US" sz="2400" b="1" dirty="0" smtClean="0">
+                <a:solidFill>
+                  <a:srgbClr val="404040"/>
+                </a:solidFill>
+              </a:rPr>
+              <a:t> September</a:t>
+            </a:r>
+            <a:r>
+              <a:rPr sz="2400" b="1" dirty="0" smtClean="0">
+                <a:solidFill>
+                  <a:srgbClr val="404040"/>
+                </a:solidFill>
+              </a:rPr>
+              <a:t> </a:t>
+            </a:r>
+            <a:r>
               <a:rPr sz="2400" b="1" dirty="0">
                 <a:solidFill>
                   <a:srgbClr val="404040"/>
                 </a:solidFill>
               </a:rPr>
-              <a:t>27 August 2015</a:t>
+              <a:t>2015</a:t>
             </a:r>
             <a:endParaRPr sz="2400" dirty="0">
               <a:solidFill>

</xml_diff>